<commit_message>
Update 회사소개 pdf, html | 깃허브 정리 pdf
</commit_message>
<xml_diff>
--- a/10Week/깃허브 정리/깃허브 정리.pptx
+++ b/10Week/깃허브 정리/깃허브 정리.pptx
@@ -5,7 +5,7 @@
     <p:sldMasterId id="2147483648" r:id="rId1"/>
   </p:sldMasterIdLst>
   <p:notesMasterIdLst>
-    <p:notesMasterId r:id="rId13"/>
+    <p:notesMasterId r:id="rId14"/>
   </p:notesMasterIdLst>
   <p:sldIdLst>
     <p:sldId id="256" r:id="rId2"/>
@@ -18,7 +18,8 @@
     <p:sldId id="263" r:id="rId9"/>
     <p:sldId id="264" r:id="rId10"/>
     <p:sldId id="265" r:id="rId11"/>
-    <p:sldId id="266" r:id="rId12"/>
+    <p:sldId id="267" r:id="rId12"/>
+    <p:sldId id="266" r:id="rId13"/>
   </p:sldIdLst>
   <p:sldSz cx="12192000" cy="6858000"/>
   <p:notesSz cx="6858000" cy="9144000"/>
@@ -4067,6 +4068,140 @@
 </file>
 
 <file path=ppt/slides/slide11.xml><?xml version="1.0" encoding="utf-8"?>
+<p:sld xmlns:a="http://schemas.openxmlformats.org/drawingml/2006/main" xmlns:r="http://schemas.openxmlformats.org/officeDocument/2006/relationships" xmlns:p="http://schemas.openxmlformats.org/presentationml/2006/main">
+  <p:cSld>
+    <p:spTree>
+      <p:nvGrpSpPr>
+        <p:cNvPr id="1" name=""/>
+        <p:cNvGrpSpPr/>
+        <p:nvPr/>
+      </p:nvGrpSpPr>
+      <p:grpSpPr>
+        <a:xfrm>
+          <a:off x="0" y="0"/>
+          <a:ext cx="0" cy="0"/>
+          <a:chOff x="0" y="0"/>
+          <a:chExt cx="0" cy="0"/>
+        </a:xfrm>
+      </p:grpSpPr>
+      <p:sp>
+        <p:nvSpPr>
+          <p:cNvPr id="2" name="제목 1">
+            <a:extLst>
+              <a:ext uri="{FF2B5EF4-FFF2-40B4-BE49-F238E27FC236}">
+                <a16:creationId xmlns:a16="http://schemas.microsoft.com/office/drawing/2014/main" id="{F16B7A43-45DA-3978-50EA-7E9E7BEF4859}"/>
+              </a:ext>
+            </a:extLst>
+          </p:cNvPr>
+          <p:cNvSpPr>
+            <a:spLocks noGrp="1"/>
+          </p:cNvSpPr>
+          <p:nvPr>
+            <p:ph type="title"/>
+          </p:nvPr>
+        </p:nvSpPr>
+        <p:spPr/>
+        <p:txBody>
+          <a:bodyPr/>
+          <a:lstStyle/>
+          <a:p>
+            <a:r>
+              <a:rPr lang="en-US" altLang="ko-KR" dirty="0"/>
+              <a:t>10</a:t>
+            </a:r>
+            <a:r>
+              <a:rPr lang="ko-KR" altLang="en-US" dirty="0"/>
+              <a:t>주차 실습과제</a:t>
+            </a:r>
+          </a:p>
+        </p:txBody>
+      </p:sp>
+      <p:pic>
+        <p:nvPicPr>
+          <p:cNvPr id="5" name="그림 4">
+            <a:extLst>
+              <a:ext uri="{FF2B5EF4-FFF2-40B4-BE49-F238E27FC236}">
+                <a16:creationId xmlns:a16="http://schemas.microsoft.com/office/drawing/2014/main" id="{37E53AD5-A84A-6C87-EA9F-ACEE7B0DDA2A}"/>
+              </a:ext>
+            </a:extLst>
+          </p:cNvPr>
+          <p:cNvPicPr>
+            <a:picLocks noChangeAspect="1"/>
+          </p:cNvPicPr>
+          <p:nvPr/>
+        </p:nvPicPr>
+        <p:blipFill>
+          <a:blip r:embed="rId2">
+            <a:extLst>
+              <a:ext uri="{28A0092B-C50C-407E-A947-70E740481C1C}">
+                <a14:useLocalDpi xmlns:a14="http://schemas.microsoft.com/office/drawing/2010/main" val="0"/>
+              </a:ext>
+            </a:extLst>
+          </a:blip>
+          <a:stretch>
+            <a:fillRect/>
+          </a:stretch>
+        </p:blipFill>
+        <p:spPr>
+          <a:xfrm>
+            <a:off x="0" y="1690688"/>
+            <a:ext cx="8802328" cy="2610214"/>
+          </a:xfrm>
+          <a:prstGeom prst="rect">
+            <a:avLst/>
+          </a:prstGeom>
+        </p:spPr>
+      </p:pic>
+      <p:pic>
+        <p:nvPicPr>
+          <p:cNvPr id="7" name="그림 6">
+            <a:extLst>
+              <a:ext uri="{FF2B5EF4-FFF2-40B4-BE49-F238E27FC236}">
+                <a16:creationId xmlns:a16="http://schemas.microsoft.com/office/drawing/2014/main" id="{9105B0F0-665E-0D74-1446-5A2E6192C478}"/>
+              </a:ext>
+            </a:extLst>
+          </p:cNvPr>
+          <p:cNvPicPr>
+            <a:picLocks noChangeAspect="1"/>
+          </p:cNvPicPr>
+          <p:nvPr/>
+        </p:nvPicPr>
+        <p:blipFill>
+          <a:blip r:embed="rId3">
+            <a:extLst>
+              <a:ext uri="{28A0092B-C50C-407E-A947-70E740481C1C}">
+                <a14:useLocalDpi xmlns:a14="http://schemas.microsoft.com/office/drawing/2010/main" val="0"/>
+              </a:ext>
+            </a:extLst>
+          </a:blip>
+          <a:stretch>
+            <a:fillRect/>
+          </a:stretch>
+        </p:blipFill>
+        <p:spPr>
+          <a:xfrm>
+            <a:off x="1846382" y="3266083"/>
+            <a:ext cx="10345618" cy="2655292"/>
+          </a:xfrm>
+          <a:prstGeom prst="rect">
+            <a:avLst/>
+          </a:prstGeom>
+        </p:spPr>
+      </p:pic>
+    </p:spTree>
+    <p:extLst>
+      <p:ext uri="{BB962C8B-B14F-4D97-AF65-F5344CB8AC3E}">
+        <p14:creationId xmlns:p14="http://schemas.microsoft.com/office/powerpoint/2010/main" val="3728752912"/>
+      </p:ext>
+    </p:extLst>
+  </p:cSld>
+  <p:clrMapOvr>
+    <a:masterClrMapping/>
+  </p:clrMapOvr>
+</p:sld>
+</file>
+
+<file path=ppt/slides/slide12.xml><?xml version="1.0" encoding="utf-8"?>
 <p:sld xmlns:a="http://schemas.openxmlformats.org/drawingml/2006/main" xmlns:r="http://schemas.openxmlformats.org/officeDocument/2006/relationships" xmlns:p="http://schemas.openxmlformats.org/presentationml/2006/main">
   <p:cSld>
     <p:spTree>

</xml_diff>